<commit_message>
orderer is also a organization
</commit_message>
<xml_diff>
--- a/img/example_network.pptx
+++ b/img/example_network.pptx
@@ -4513,6 +4513,176 @@
           </a:p>
         </p:txBody>
       </p:sp>
+      <p:grpSp>
+        <p:nvGrpSpPr>
+          <p:cNvPr id="45" name="Group 44">
+            <a:extLst>
+              <a:ext uri="{FF2B5EF4-FFF2-40B4-BE49-F238E27FC236}">
+                <a16:creationId xmlns:a16="http://schemas.microsoft.com/office/drawing/2014/main" id="{BF4540D6-818A-C532-8413-D81468CDAE9E}"/>
+              </a:ext>
+            </a:extLst>
+          </p:cNvPr>
+          <p:cNvGrpSpPr/>
+          <p:nvPr/>
+        </p:nvGrpSpPr>
+        <p:grpSpPr>
+          <a:xfrm>
+            <a:off x="5610108" y="5661784"/>
+            <a:ext cx="683170" cy="558520"/>
+            <a:chOff x="1051034" y="1923393"/>
+            <a:chExt cx="683170" cy="558520"/>
+          </a:xfrm>
+          <a:solidFill>
+            <a:srgbClr val="FFC000"/>
+          </a:solidFill>
+        </p:grpSpPr>
+        <p:sp>
+          <p:nvSpPr>
+            <p:cNvPr id="46" name="Triangle 45">
+              <a:extLst>
+                <a:ext uri="{FF2B5EF4-FFF2-40B4-BE49-F238E27FC236}">
+                  <a16:creationId xmlns:a16="http://schemas.microsoft.com/office/drawing/2014/main" id="{7080117F-06C9-81D3-788D-159136F7BA06}"/>
+                </a:ext>
+              </a:extLst>
+            </p:cNvPr>
+            <p:cNvSpPr/>
+            <p:nvPr/>
+          </p:nvSpPr>
+          <p:spPr>
+            <a:xfrm>
+              <a:off x="1051034" y="1923393"/>
+              <a:ext cx="609600" cy="525517"/>
+            </a:xfrm>
+            <a:prstGeom prst="triangle">
+              <a:avLst/>
+            </a:prstGeom>
+            <a:grpFill/>
+          </p:spPr>
+          <p:style>
+            <a:lnRef idx="2">
+              <a:schemeClr val="accent1">
+                <a:shade val="50000"/>
+              </a:schemeClr>
+            </a:lnRef>
+            <a:fillRef idx="1">
+              <a:schemeClr val="accent1"/>
+            </a:fillRef>
+            <a:effectRef idx="0">
+              <a:schemeClr val="accent1"/>
+            </a:effectRef>
+            <a:fontRef idx="minor">
+              <a:schemeClr val="lt1"/>
+            </a:fontRef>
+          </p:style>
+          <p:txBody>
+            <a:bodyPr rtlCol="0" anchor="ctr"/>
+            <a:lstStyle/>
+            <a:p>
+              <a:pPr algn="ctr"/>
+              <a:endParaRPr lang="en-US" sz="500" dirty="0">
+                <a:solidFill>
+                  <a:srgbClr val="FF0000"/>
+                </a:solidFill>
+              </a:endParaRPr>
+            </a:p>
+          </p:txBody>
+        </p:sp>
+        <p:sp>
+          <p:nvSpPr>
+            <p:cNvPr id="47" name="TextBox 46">
+              <a:extLst>
+                <a:ext uri="{FF2B5EF4-FFF2-40B4-BE49-F238E27FC236}">
+                  <a16:creationId xmlns:a16="http://schemas.microsoft.com/office/drawing/2014/main" id="{2437B292-B875-28AB-6710-013578C4E155}"/>
+                </a:ext>
+              </a:extLst>
+            </p:cNvPr>
+            <p:cNvSpPr txBox="1"/>
+            <p:nvPr/>
+          </p:nvSpPr>
+          <p:spPr>
+            <a:xfrm>
+              <a:off x="1124604" y="2112581"/>
+              <a:ext cx="609600" cy="369332"/>
+            </a:xfrm>
+            <a:prstGeom prst="rect">
+              <a:avLst/>
+            </a:prstGeom>
+            <a:noFill/>
+            <a:ln>
+              <a:noFill/>
+            </a:ln>
+          </p:spPr>
+          <p:txBody>
+            <a:bodyPr wrap="square" rtlCol="0">
+              <a:spAutoFit/>
+            </a:bodyPr>
+            <a:lstStyle/>
+            <a:p>
+              <a:r>
+                <a:rPr lang="en-US" sz="900" dirty="0">
+                  <a:solidFill>
+                    <a:schemeClr val="bg1"/>
+                  </a:solidFill>
+                </a:rPr>
+                <a:t>Order Org</a:t>
+              </a:r>
+            </a:p>
+          </p:txBody>
+        </p:sp>
+      </p:grpSp>
+      <p:sp>
+        <p:nvSpPr>
+          <p:cNvPr id="51" name="Oval 50">
+            <a:extLst>
+              <a:ext uri="{FF2B5EF4-FFF2-40B4-BE49-F238E27FC236}">
+                <a16:creationId xmlns:a16="http://schemas.microsoft.com/office/drawing/2014/main" id="{CA5F7249-36D5-D7B0-D00F-C9BC6692C111}"/>
+              </a:ext>
+            </a:extLst>
+          </p:cNvPr>
+          <p:cNvSpPr/>
+          <p:nvPr/>
+        </p:nvSpPr>
+        <p:spPr>
+          <a:xfrm>
+            <a:off x="5191265" y="3636502"/>
+            <a:ext cx="1451997" cy="2858891"/>
+          </a:xfrm>
+          <a:prstGeom prst="ellipse">
+            <a:avLst/>
+          </a:prstGeom>
+          <a:noFill/>
+          <a:ln w="38100">
+            <a:solidFill>
+              <a:srgbClr val="FFC000"/>
+            </a:solidFill>
+            <a:prstDash val="dash"/>
+          </a:ln>
+        </p:spPr>
+        <p:style>
+          <a:lnRef idx="2">
+            <a:schemeClr val="accent1">
+              <a:shade val="50000"/>
+            </a:schemeClr>
+          </a:lnRef>
+          <a:fillRef idx="1">
+            <a:schemeClr val="accent1"/>
+          </a:fillRef>
+          <a:effectRef idx="0">
+            <a:schemeClr val="accent1"/>
+          </a:effectRef>
+          <a:fontRef idx="minor">
+            <a:schemeClr val="lt1"/>
+          </a:fontRef>
+        </p:style>
+        <p:txBody>
+          <a:bodyPr rtlCol="0" anchor="ctr"/>
+          <a:lstStyle/>
+          <a:p>
+            <a:pPr algn="ctr"/>
+            <a:endParaRPr lang="en-US"/>
+          </a:p>
+        </p:txBody>
+      </p:sp>
     </p:spTree>
     <p:extLst>
       <p:ext uri="{BB962C8B-B14F-4D97-AF65-F5344CB8AC3E}">

</xml_diff>